<commit_message>
Examples String and Text
</commit_message>
<xml_diff>
--- a/08-Strings-and-Text-Manipulations.pptx
+++ b/08-Strings-and-Text-Manipulations.pptx
@@ -238,7 +238,7 @@
           <a:p>
             <a:fld id="{1A052DDE-B79B-4585-97B6-DCDE6083B029}" type="datetimeFigureOut">
               <a:rPr lang="bg-BG" smtClean="0"/>
-              <a:t>29.5.2015 г.</a:t>
+              <a:t>17.8.2015 г.</a:t>
             </a:fld>
             <a:endParaRPr lang="bg-BG"/>
           </a:p>
@@ -687,7 +687,7 @@
           <a:p>
             <a:fld id="{3EA744D9-3FBE-48D8-BF2A-85DF203E4D20}" type="datetimeFigureOut">
               <a:rPr lang="bg-BG" smtClean="0"/>
-              <a:t>29.5.2015 г.</a:t>
+              <a:t>17.8.2015 г.</a:t>
             </a:fld>
             <a:endParaRPr lang="bg-BG"/>
           </a:p>
@@ -857,7 +857,7 @@
           <a:p>
             <a:fld id="{3EA744D9-3FBE-48D8-BF2A-85DF203E4D20}" type="datetimeFigureOut">
               <a:rPr lang="bg-BG" smtClean="0"/>
-              <a:t>29.5.2015 г.</a:t>
+              <a:t>17.8.2015 г.</a:t>
             </a:fld>
             <a:endParaRPr lang="bg-BG"/>
           </a:p>
@@ -1037,7 +1037,7 @@
           <a:p>
             <a:fld id="{3EA744D9-3FBE-48D8-BF2A-85DF203E4D20}" type="datetimeFigureOut">
               <a:rPr lang="bg-BG" smtClean="0"/>
-              <a:t>29.5.2015 г.</a:t>
+              <a:t>17.8.2015 г.</a:t>
             </a:fld>
             <a:endParaRPr lang="bg-BG"/>
           </a:p>
@@ -1207,7 +1207,7 @@
           <a:p>
             <a:fld id="{3EA744D9-3FBE-48D8-BF2A-85DF203E4D20}" type="datetimeFigureOut">
               <a:rPr lang="bg-BG" smtClean="0"/>
-              <a:t>29.5.2015 г.</a:t>
+              <a:t>17.8.2015 г.</a:t>
             </a:fld>
             <a:endParaRPr lang="bg-BG"/>
           </a:p>
@@ -1453,7 +1453,7 @@
           <a:p>
             <a:fld id="{3EA744D9-3FBE-48D8-BF2A-85DF203E4D20}" type="datetimeFigureOut">
               <a:rPr lang="bg-BG" smtClean="0"/>
-              <a:t>29.5.2015 г.</a:t>
+              <a:t>17.8.2015 г.</a:t>
             </a:fld>
             <a:endParaRPr lang="bg-BG"/>
           </a:p>
@@ -1741,7 +1741,7 @@
           <a:p>
             <a:fld id="{3EA744D9-3FBE-48D8-BF2A-85DF203E4D20}" type="datetimeFigureOut">
               <a:rPr lang="bg-BG" smtClean="0"/>
-              <a:t>29.5.2015 г.</a:t>
+              <a:t>17.8.2015 г.</a:t>
             </a:fld>
             <a:endParaRPr lang="bg-BG"/>
           </a:p>
@@ -2163,7 +2163,7 @@
           <a:p>
             <a:fld id="{3EA744D9-3FBE-48D8-BF2A-85DF203E4D20}" type="datetimeFigureOut">
               <a:rPr lang="bg-BG" smtClean="0"/>
-              <a:t>29.5.2015 г.</a:t>
+              <a:t>17.8.2015 г.</a:t>
             </a:fld>
             <a:endParaRPr lang="bg-BG"/>
           </a:p>
@@ -2281,7 +2281,7 @@
           <a:p>
             <a:fld id="{3EA744D9-3FBE-48D8-BF2A-85DF203E4D20}" type="datetimeFigureOut">
               <a:rPr lang="bg-BG" smtClean="0"/>
-              <a:t>29.5.2015 г.</a:t>
+              <a:t>17.8.2015 г.</a:t>
             </a:fld>
             <a:endParaRPr lang="bg-BG"/>
           </a:p>
@@ -2376,7 +2376,7 @@
           <a:p>
             <a:fld id="{3EA744D9-3FBE-48D8-BF2A-85DF203E4D20}" type="datetimeFigureOut">
               <a:rPr lang="bg-BG" smtClean="0"/>
-              <a:t>29.5.2015 г.</a:t>
+              <a:t>17.8.2015 г.</a:t>
             </a:fld>
             <a:endParaRPr lang="bg-BG"/>
           </a:p>
@@ -2653,7 +2653,7 @@
           <a:p>
             <a:fld id="{3EA744D9-3FBE-48D8-BF2A-85DF203E4D20}" type="datetimeFigureOut">
               <a:rPr lang="bg-BG" smtClean="0"/>
-              <a:t>29.5.2015 г.</a:t>
+              <a:t>17.8.2015 г.</a:t>
             </a:fld>
             <a:endParaRPr lang="bg-BG"/>
           </a:p>
@@ -2906,7 +2906,7 @@
           <a:p>
             <a:fld id="{3EA744D9-3FBE-48D8-BF2A-85DF203E4D20}" type="datetimeFigureOut">
               <a:rPr lang="bg-BG" smtClean="0"/>
-              <a:t>29.5.2015 г.</a:t>
+              <a:t>17.8.2015 г.</a:t>
             </a:fld>
             <a:endParaRPr lang="bg-BG"/>
           </a:p>
@@ -3128,7 +3128,7 @@
           <a:p>
             <a:fld id="{3EA744D9-3FBE-48D8-BF2A-85DF203E4D20}" type="datetimeFigureOut">
               <a:rPr lang="bg-BG" smtClean="0"/>
-              <a:t>29.5.2015 г.</a:t>
+              <a:t>17.8.2015 г.</a:t>
             </a:fld>
             <a:endParaRPr lang="bg-BG"/>
           </a:p>
@@ -4510,7 +4510,7 @@
                   </a:schemeClr>
                 </a:solidFill>
               </a:rPr>
-              <a:t>“Greeting”</a:t>
+              <a:t>“John”</a:t>
             </a:r>
             <a:endParaRPr lang="ru-RU" sz="2000" dirty="0">
               <a:solidFill>
@@ -4542,7 +4542,17 @@
                   </a:schemeClr>
                 </a:solidFill>
               </a:rPr>
-              <a:t>с точка</a:t>
+              <a:t>с </a:t>
+            </a:r>
+            <a:r>
+              <a:rPr lang="en-US" sz="2000" dirty="0" smtClean="0">
+                <a:solidFill>
+                  <a:schemeClr val="bg1">
+                    <a:lumMod val="95000"/>
+                  </a:schemeClr>
+                </a:solidFill>
+              </a:rPr>
+              <a:t>!</a:t>
             </a:r>
             <a:endParaRPr lang="ru-RU" sz="2000" dirty="0">
               <a:solidFill>
@@ -4584,7 +4594,7 @@
                   </a:schemeClr>
                 </a:solidFill>
               </a:rPr>
-              <a:t>“water”</a:t>
+              <a:t>“party”</a:t>
             </a:r>
             <a:endParaRPr lang="ru-RU" sz="2000" dirty="0">
               <a:solidFill>
@@ -4660,7 +4670,7 @@
                   </a:schemeClr>
                 </a:solidFill>
               </a:rPr>
-              <a:t>Greeting traveler, do you want a cup of fresh water.</a:t>
+              <a:t>Hello John, are you ready for the party tonight.</a:t>
             </a:r>
             <a:endParaRPr lang="ru-RU" sz="2400" dirty="0">
               <a:solidFill>
@@ -9733,7 +9743,47 @@
                   </a:schemeClr>
                 </a:solidFill>
               </a:rPr>
-              <a:t>2 + (2-6)) + 6/(8 - 1) - грешно</a:t>
+              <a:t>2 + (2-6</a:t>
+            </a:r>
+            <a:r>
+              <a:rPr lang="ru-RU" sz="1600" dirty="0" smtClean="0">
+                <a:solidFill>
+                  <a:schemeClr val="bg1">
+                    <a:lumMod val="95000"/>
+                  </a:schemeClr>
+                </a:solidFill>
+              </a:rPr>
+              <a:t>))</a:t>
+            </a:r>
+            <a:r>
+              <a:rPr lang="en-US" sz="1600" dirty="0" smtClean="0">
+                <a:solidFill>
+                  <a:schemeClr val="bg1">
+                    <a:lumMod val="95000"/>
+                  </a:schemeClr>
+                </a:solidFill>
+              </a:rPr>
+              <a:t>(</a:t>
+            </a:r>
+            <a:r>
+              <a:rPr lang="ru-RU" sz="1600" dirty="0" smtClean="0">
+                <a:solidFill>
+                  <a:schemeClr val="bg1">
+                    <a:lumMod val="95000"/>
+                  </a:schemeClr>
+                </a:solidFill>
+              </a:rPr>
+              <a:t> </a:t>
+            </a:r>
+            <a:r>
+              <a:rPr lang="ru-RU" sz="1600" dirty="0">
+                <a:solidFill>
+                  <a:schemeClr val="bg1">
+                    <a:lumMod val="95000"/>
+                  </a:schemeClr>
+                </a:solidFill>
+              </a:rPr>
+              <a:t>+ 6/(8 - 1) - грешно</a:t>
             </a:r>
           </a:p>
           <a:p>

</xml_diff>